<commit_message>
updated qadr nights amaal, added more duas in 19th night amaal
</commit_message>
<xml_diff>
--- a/Slides/PPTs/Dua Kumayl.pptx
+++ b/Slides/PPTs/Dua Kumayl.pptx
@@ -461,7 +461,7 @@
           <a:p>
             <a:fld id="{F192BFF6-EB1E-4216-AE1F-8531F2060E7A}" type="datetimeFigureOut">
               <a:rPr lang="en-CA" smtClean="0"/>
-              <a:t>2024-03-15</a:t>
+              <a:t>2024-03-29</a:t>
             </a:fld>
             <a:endParaRPr lang="en-CA"/>
           </a:p>
@@ -9310,7 +9310,15 @@
           <a:p>
             <a:r>
               <a:rPr lang="ar-SA" dirty="0"/>
-              <a:t>وَلَيتَ شِعْرِي </a:t>
+              <a:t>وَلَي</a:t>
+            </a:r>
+            <a:r>
+              <a:rPr lang="ar-IQ" dirty="0"/>
+              <a:t>ْ</a:t>
+            </a:r>
+            <a:r>
+              <a:rPr lang="ar-SA" dirty="0"/>
+              <a:t>تَ شِعْرِي </a:t>
             </a:r>
             <a:r>
               <a:rPr lang="ar-SA" dirty="0" err="1"/>
@@ -9550,11 +9558,15 @@
             </a:r>
             <a:r>
               <a:rPr lang="ar-SA" dirty="0" err="1"/>
-              <a:t>بِتَوحِیدِكَ</a:t>
-            </a:r>
-            <a:r>
-              <a:rPr lang="ar-SA" dirty="0"/>
-              <a:t> صَادِقَةً</a:t>
+              <a:t>بِتَوحِی</a:t>
+            </a:r>
+            <a:r>
+              <a:rPr lang="ar-IQ" dirty="0"/>
+              <a:t>ْ</a:t>
+            </a:r>
+            <a:r>
+              <a:rPr lang="ar-SA" dirty="0"/>
+              <a:t>دِكَ صَادِقَةً</a:t>
             </a:r>
             <a:br>
               <a:rPr lang="ar-SA" dirty="0"/>
@@ -17150,9 +17162,10 @@
           <a:bodyPr/>
           <a:lstStyle/>
           <a:p>
-            <a:r>
-              <a:rPr lang="ar-SA" dirty="0"/>
-              <a:t>لكِنَّكَ تَقَدَّسَتْ أَسْمَاؤُكَ</a:t>
+            <a:pPr rtl="1"/>
+            <a:r>
+              <a:rPr lang="ar-SA" dirty="0"/>
+              <a:t>لٰكِنَّكَ تَقَدَّسَتْ أَسْمَاؤُكَ</a:t>
             </a:r>
             <a:br>
               <a:rPr lang="ar-SA" dirty="0"/>
@@ -17716,6 +17729,7 @@
           <a:bodyPr/>
           <a:lstStyle/>
           <a:p>
+            <a:pPr rtl="1"/>
             <a:r>
               <a:rPr lang="ar-SA" dirty="0"/>
               <a:t>إِلٰهِي </a:t>
@@ -37749,6 +37763,7 @@
           <a:bodyPr/>
           <a:lstStyle/>
           <a:p>
+            <a:pPr rtl="1"/>
             <a:r>
               <a:rPr lang="ar-SA" dirty="0"/>
               <a:t>وَبَعْدَ صِدْقِ </a:t>
@@ -37766,11 +37781,23 @@
             </a:br>
             <a:r>
               <a:rPr lang="ar-SA" dirty="0"/>
-              <a:t>خَاضِعاً </a:t>
+              <a:t>خَاضِع</a:t>
+            </a:r>
+            <a:r>
+              <a:rPr lang="ar-IQ" dirty="0"/>
+              <a:t>َ</a:t>
+            </a:r>
+            <a:r>
+              <a:rPr lang="ar-SA" dirty="0"/>
+              <a:t>ا ل</a:t>
+            </a:r>
+            <a:r>
+              <a:rPr lang="ar-IQ" dirty="0"/>
+              <a:t>ِّ</a:t>
             </a:r>
             <a:r>
               <a:rPr lang="ar-SA" dirty="0" err="1"/>
-              <a:t>لِرُبُوبِیَّتِكَ</a:t>
+              <a:t>رُبُوبِیَّتِكَ</a:t>
             </a:r>
             <a:endParaRPr lang="ar-SA" dirty="0"/>
           </a:p>
@@ -37873,6 +37900,7 @@
           <a:bodyPr/>
           <a:lstStyle/>
           <a:p>
+            <a:pPr rtl="1"/>
             <a:r>
               <a:rPr lang="ar-SA" dirty="0"/>
               <a:t>هَيْهاتَ أَنْتَ أَكْرَمُ مِنْ أَنْ </a:t>
@@ -37883,7 +37911,15 @@
             </a:r>
             <a:r>
               <a:rPr lang="ar-SA" dirty="0"/>
-              <a:t> مَنْ رَبَّيْتَهُ</a:t>
+              <a:t> مَنْ ر</a:t>
+            </a:r>
+            <a:r>
+              <a:rPr lang="ar-IQ" dirty="0"/>
+              <a:t>َّ</a:t>
+            </a:r>
+            <a:r>
+              <a:rPr lang="ar-SA" dirty="0"/>
+              <a:t>بَّيْتَهُ</a:t>
             </a:r>
           </a:p>
         </p:txBody>
@@ -37985,15 +38021,23 @@
           <a:bodyPr/>
           <a:lstStyle/>
           <a:p>
+            <a:pPr rtl="1"/>
             <a:r>
               <a:rPr lang="ar-SA" dirty="0"/>
               <a:t>أَوْ تُبْعِدَ مَنْ </a:t>
             </a:r>
             <a:r>
               <a:rPr lang="ar-SA" dirty="0" err="1"/>
-              <a:t>أَدْنَیتَهُ</a:t>
-            </a:r>
-            <a:endParaRPr lang="ar-SA" dirty="0"/>
+              <a:t>أَدْنَی</a:t>
+            </a:r>
+            <a:r>
+              <a:rPr lang="ar-IQ" dirty="0"/>
+              <a:t>ْ</a:t>
+            </a:r>
+            <a:r>
+              <a:rPr lang="ar-SA" dirty="0"/>
+              <a:t>تَهُ</a:t>
+            </a:r>
           </a:p>
         </p:txBody>
       </p:sp>
@@ -38100,9 +38144,16 @@
             </a:r>
             <a:r>
               <a:rPr lang="ar-SA" dirty="0" err="1"/>
-              <a:t>آوَیتَهُ</a:t>
-            </a:r>
-            <a:endParaRPr lang="ar-SA" dirty="0"/>
+              <a:t>آوَی</a:t>
+            </a:r>
+            <a:r>
+              <a:rPr lang="ar-IQ" dirty="0"/>
+              <a:t>ْ</a:t>
+            </a:r>
+            <a:r>
+              <a:rPr lang="ar-SA" dirty="0"/>
+              <a:t>تَهُ</a:t>
+            </a:r>
           </a:p>
         </p:txBody>
       </p:sp>

</xml_diff>